<commit_message>
Reorder slide deck and add YouTube link
</commit_message>
<xml_diff>
--- a/COMP140/04/2019-20-COMP140-04-lecture.pptx
+++ b/COMP140/04/2019-20-COMP140-04-lecture.pptx
@@ -18,33 +18,33 @@
     <p:sldId id="295" r:id="rId6"/>
     <p:sldId id="307" r:id="rId7"/>
     <p:sldId id="297" r:id="rId8"/>
-    <p:sldId id="303" r:id="rId9"/>
-    <p:sldId id="296" r:id="rId10"/>
-    <p:sldId id="309" r:id="rId11"/>
-    <p:sldId id="310" r:id="rId12"/>
-    <p:sldId id="311" r:id="rId13"/>
-    <p:sldId id="298" r:id="rId14"/>
-    <p:sldId id="312" r:id="rId15"/>
-    <p:sldId id="313" r:id="rId16"/>
-    <p:sldId id="300" r:id="rId17"/>
-    <p:sldId id="314" r:id="rId18"/>
-    <p:sldId id="315" r:id="rId19"/>
-    <p:sldId id="316" r:id="rId20"/>
-    <p:sldId id="318" r:id="rId21"/>
-    <p:sldId id="299" r:id="rId22"/>
-    <p:sldId id="317" r:id="rId23"/>
-    <p:sldId id="302" r:id="rId24"/>
-    <p:sldId id="304" r:id="rId25"/>
-    <p:sldId id="319" r:id="rId26"/>
-    <p:sldId id="321" r:id="rId27"/>
-    <p:sldId id="322" r:id="rId28"/>
-    <p:sldId id="323" r:id="rId29"/>
-    <p:sldId id="320" r:id="rId30"/>
-    <p:sldId id="324" r:id="rId31"/>
-    <p:sldId id="325" r:id="rId32"/>
-    <p:sldId id="326" r:id="rId33"/>
-    <p:sldId id="308" r:id="rId34"/>
-    <p:sldId id="306" r:id="rId35"/>
+    <p:sldId id="306" r:id="rId9"/>
+    <p:sldId id="303" r:id="rId10"/>
+    <p:sldId id="296" r:id="rId11"/>
+    <p:sldId id="309" r:id="rId12"/>
+    <p:sldId id="310" r:id="rId13"/>
+    <p:sldId id="311" r:id="rId14"/>
+    <p:sldId id="298" r:id="rId15"/>
+    <p:sldId id="312" r:id="rId16"/>
+    <p:sldId id="313" r:id="rId17"/>
+    <p:sldId id="300" r:id="rId18"/>
+    <p:sldId id="314" r:id="rId19"/>
+    <p:sldId id="315" r:id="rId20"/>
+    <p:sldId id="316" r:id="rId21"/>
+    <p:sldId id="318" r:id="rId22"/>
+    <p:sldId id="299" r:id="rId23"/>
+    <p:sldId id="317" r:id="rId24"/>
+    <p:sldId id="302" r:id="rId25"/>
+    <p:sldId id="304" r:id="rId26"/>
+    <p:sldId id="319" r:id="rId27"/>
+    <p:sldId id="321" r:id="rId28"/>
+    <p:sldId id="322" r:id="rId29"/>
+    <p:sldId id="323" r:id="rId30"/>
+    <p:sldId id="320" r:id="rId31"/>
+    <p:sldId id="324" r:id="rId32"/>
+    <p:sldId id="325" r:id="rId33"/>
+    <p:sldId id="326" r:id="rId34"/>
+    <p:sldId id="308" r:id="rId35"/>
   </p:sldIdLst>
   <p:sldSz cx="9144000" cy="6858000" type="screen4x3"/>
   <p:notesSz cx="7315200" cy="9601200"/>
@@ -155,6 +155,7 @@
             <p14:sldId id="295"/>
             <p14:sldId id="307"/>
             <p14:sldId id="297"/>
+            <p14:sldId id="306"/>
             <p14:sldId id="303"/>
             <p14:sldId id="296"/>
             <p14:sldId id="309"/>
@@ -181,7 +182,6 @@
             <p14:sldId id="325"/>
             <p14:sldId id="326"/>
             <p14:sldId id="308"/>
-            <p14:sldId id="306"/>
           </p14:sldIdLst>
         </p14:section>
       </p14:sectionLst>
@@ -301,7 +301,7 @@
             <a:fld id="{134C908B-E4CF-4B88-8994-49C91B4DAC10}" type="datetimeFigureOut">
               <a:rPr lang="en-US" smtClean="0"/>
               <a:pPr/>
-              <a:t>2/16/2020</a:t>
+              <a:t>2/17/20</a:t>
             </a:fld>
             <a:endParaRPr lang="en-US"/>
           </a:p>
@@ -463,7 +463,7 @@
             <a:fld id="{FCD4ED34-E2A7-4A73-B53B-08CB721EE63F}" type="datetimeFigureOut">
               <a:rPr lang="en-US" smtClean="0"/>
               <a:pPr/>
-              <a:t>2/16/2020</a:t>
+              <a:t>2/17/20</a:t>
             </a:fld>
             <a:endParaRPr lang="en-GB"/>
           </a:p>
@@ -926,7 +926,7 @@
             <a:fld id="{24C0EDFE-3590-4448-BF7B-7FB41E82085F}" type="datetimeFigureOut">
               <a:rPr lang="en-US" smtClean="0"/>
               <a:pPr/>
-              <a:t>2/16/2020</a:t>
+              <a:t>2/17/20</a:t>
             </a:fld>
             <a:endParaRPr lang="en-US" dirty="0"/>
           </a:p>
@@ -1115,7 +1115,7 @@
             <a:fld id="{24C0EDFE-3590-4448-BF7B-7FB41E82085F}" type="datetimeFigureOut">
               <a:rPr lang="en-US" smtClean="0"/>
               <a:pPr/>
-              <a:t>2/16/2020</a:t>
+              <a:t>2/17/20</a:t>
             </a:fld>
             <a:endParaRPr lang="en-US" dirty="0"/>
           </a:p>
@@ -1293,7 +1293,7 @@
             <a:fld id="{24C0EDFE-3590-4448-BF7B-7FB41E82085F}" type="datetimeFigureOut">
               <a:rPr lang="en-US" smtClean="0"/>
               <a:pPr/>
-              <a:t>2/16/2020</a:t>
+              <a:t>2/17/20</a:t>
             </a:fld>
             <a:endParaRPr lang="en-US" dirty="0"/>
           </a:p>
@@ -1542,7 +1542,7 @@
             <a:fld id="{24C0EDFE-3590-4448-BF7B-7FB41E82085F}" type="datetimeFigureOut">
               <a:rPr lang="en-US" smtClean="0"/>
               <a:pPr/>
-              <a:t>2/16/2020</a:t>
+              <a:t>2/17/20</a:t>
             </a:fld>
             <a:endParaRPr lang="en-US" dirty="0"/>
           </a:p>
@@ -1864,7 +1864,7 @@
             <a:fld id="{24C0EDFE-3590-4448-BF7B-7FB41E82085F}" type="datetimeFigureOut">
               <a:rPr lang="en-US" smtClean="0"/>
               <a:pPr/>
-              <a:t>2/16/2020</a:t>
+              <a:t>2/17/20</a:t>
             </a:fld>
             <a:endParaRPr lang="en-US" dirty="0"/>
           </a:p>
@@ -2170,7 +2170,7 @@
             <a:fld id="{24C0EDFE-3590-4448-BF7B-7FB41E82085F}" type="datetimeFigureOut">
               <a:rPr lang="en-US" smtClean="0"/>
               <a:pPr/>
-              <a:t>2/16/2020</a:t>
+              <a:t>2/17/20</a:t>
             </a:fld>
             <a:endParaRPr lang="en-US" dirty="0"/>
           </a:p>
@@ -2594,7 +2594,7 @@
             <a:fld id="{24C0EDFE-3590-4448-BF7B-7FB41E82085F}" type="datetimeFigureOut">
               <a:rPr lang="en-US" smtClean="0"/>
               <a:pPr/>
-              <a:t>2/16/2020</a:t>
+              <a:t>2/17/20</a:t>
             </a:fld>
             <a:endParaRPr lang="en-US" dirty="0"/>
           </a:p>
@@ -2716,7 +2716,7 @@
             <a:fld id="{24C0EDFE-3590-4448-BF7B-7FB41E82085F}" type="datetimeFigureOut">
               <a:rPr lang="en-US" smtClean="0"/>
               <a:pPr/>
-              <a:t>2/16/2020</a:t>
+              <a:t>2/17/20</a:t>
             </a:fld>
             <a:endParaRPr lang="en-US" dirty="0"/>
           </a:p>
@@ -2808,7 +2808,7 @@
             <a:fld id="{24C0EDFE-3590-4448-BF7B-7FB41E82085F}" type="datetimeFigureOut">
               <a:rPr lang="en-US" smtClean="0"/>
               <a:pPr/>
-              <a:t>2/16/2020</a:t>
+              <a:t>2/17/20</a:t>
             </a:fld>
             <a:endParaRPr lang="en-US" dirty="0"/>
           </a:p>
@@ -3083,7 +3083,7 @@
             <a:fld id="{24C0EDFE-3590-4448-BF7B-7FB41E82085F}" type="datetimeFigureOut">
               <a:rPr lang="en-US" smtClean="0"/>
               <a:pPr/>
-              <a:t>2/16/2020</a:t>
+              <a:t>2/17/20</a:t>
             </a:fld>
             <a:endParaRPr lang="en-US" dirty="0"/>
           </a:p>
@@ -3335,7 +3335,7 @@
             <a:fld id="{24C0EDFE-3590-4448-BF7B-7FB41E82085F}" type="datetimeFigureOut">
               <a:rPr lang="en-US" smtClean="0"/>
               <a:pPr/>
-              <a:t>2/16/2020</a:t>
+              <a:t>2/17/20</a:t>
             </a:fld>
             <a:endParaRPr lang="en-US" dirty="0"/>
           </a:p>
@@ -3512,7 +3512,7 @@
             <a:fld id="{24C0EDFE-3590-4448-BF7B-7FB41E82085F}" type="datetimeFigureOut">
               <a:rPr lang="en-US" smtClean="0"/>
               <a:pPr/>
-              <a:t>2/16/2020</a:t>
+              <a:t>2/17/20</a:t>
             </a:fld>
             <a:endParaRPr lang="en-US" dirty="0"/>
           </a:p>
@@ -4213,6 +4213,176 @@
           </a:p>
         </p:txBody>
       </p:sp>
+      <p:sp>
+        <p:nvSpPr>
+          <p:cNvPr id="3" name="Content Placeholder 2">
+            <a:extLst>
+              <a:ext uri="{FF2B5EF4-FFF2-40B4-BE49-F238E27FC236}">
+                <a16:creationId xmlns:a16="http://schemas.microsoft.com/office/drawing/2014/main" id="{F11D3774-F227-E54D-8B35-5A75C345CFD0}"/>
+              </a:ext>
+            </a:extLst>
+          </p:cNvPr>
+          <p:cNvSpPr>
+            <a:spLocks noGrp="1"/>
+          </p:cNvSpPr>
+          <p:nvPr>
+            <p:ph idx="1"/>
+          </p:nvPr>
+        </p:nvSpPr>
+        <p:spPr>
+          <a:xfrm>
+            <a:off x="457200" y="1484784"/>
+            <a:ext cx="8229600" cy="5217443"/>
+          </a:xfrm>
+        </p:spPr>
+        <p:txBody>
+          <a:bodyPr anchor="ctr">
+            <a:normAutofit fontScale="92500" lnSpcReduction="10000"/>
+          </a:bodyPr>
+          <a:lstStyle/>
+          <a:p>
+            <a:r>
+              <a:rPr lang="en-GB" sz="3200" dirty="0">
+                <a:effectLst/>
+              </a:rPr>
+              <a:t>Use Case diagrams typically details the user’s interaction with the system</a:t>
+            </a:r>
+          </a:p>
+          <a:p>
+            <a:r>
+              <a:rPr lang="en-GB" dirty="0"/>
+              <a:t>In essence it details the </a:t>
+            </a:r>
+            <a:r>
+              <a:rPr lang="en-GB" b="1" dirty="0"/>
+              <a:t>Use Case</a:t>
+            </a:r>
+            <a:r>
+              <a:rPr lang="en-GB" dirty="0"/>
+              <a:t> of the system and the </a:t>
+            </a:r>
+            <a:r>
+              <a:rPr lang="en-GB" b="1" dirty="0"/>
+              <a:t>Actors</a:t>
+            </a:r>
+            <a:r>
+              <a:rPr lang="en-GB" dirty="0"/>
+              <a:t> which interact with the system</a:t>
+            </a:r>
+          </a:p>
+          <a:p>
+            <a:pPr lvl="1"/>
+            <a:r>
+              <a:rPr lang="en-GB" b="1" dirty="0"/>
+              <a:t>NB.</a:t>
+            </a:r>
+            <a:r>
+              <a:rPr lang="en-GB" dirty="0"/>
+              <a:t> These </a:t>
+            </a:r>
+            <a:r>
+              <a:rPr lang="en-GB" b="1" dirty="0"/>
+              <a:t>Actors</a:t>
+            </a:r>
+            <a:r>
+              <a:rPr lang="en-GB" dirty="0"/>
+              <a:t> could be other systems!</a:t>
+            </a:r>
+          </a:p>
+          <a:p>
+            <a:r>
+              <a:rPr lang="en-GB" dirty="0"/>
+              <a:t>Created using terms that a layman could understand</a:t>
+            </a:r>
+          </a:p>
+          <a:p>
+            <a:r>
+              <a:rPr lang="en-GB" dirty="0"/>
+              <a:t>Can be used to capture and communicate User Requirements</a:t>
+            </a:r>
+          </a:p>
+          <a:p>
+            <a:r>
+              <a:rPr lang="en-GB" dirty="0"/>
+              <a:t>This is often the first diagram created for a system</a:t>
+            </a:r>
+          </a:p>
+          <a:p>
+            <a:endParaRPr lang="en-GB" sz="3200" dirty="0">
+              <a:effectLst/>
+            </a:endParaRPr>
+          </a:p>
+        </p:txBody>
+      </p:sp>
+    </p:spTree>
+    <p:extLst>
+      <p:ext uri="{BB962C8B-B14F-4D97-AF65-F5344CB8AC3E}">
+        <p14:creationId xmlns:p14="http://schemas.microsoft.com/office/powerpoint/2010/main" val="1124580537"/>
+      </p:ext>
+    </p:extLst>
+  </p:cSld>
+  <p:clrMapOvr>
+    <a:masterClrMapping/>
+  </p:clrMapOvr>
+</p:sld>
+</file>
+
+<file path=ppt/slides/slide11.xml><?xml version="1.0" encoding="utf-8"?>
+<p:sld xmlns:a="http://schemas.openxmlformats.org/drawingml/2006/main" xmlns:r="http://schemas.openxmlformats.org/officeDocument/2006/relationships" xmlns:p="http://schemas.openxmlformats.org/presentationml/2006/main">
+  <p:cSld>
+    <p:spTree>
+      <p:nvGrpSpPr>
+        <p:cNvPr id="1" name=""/>
+        <p:cNvGrpSpPr/>
+        <p:nvPr/>
+      </p:nvGrpSpPr>
+      <p:grpSpPr>
+        <a:xfrm>
+          <a:off x="0" y="0"/>
+          <a:ext cx="0" cy="0"/>
+          <a:chOff x="0" y="0"/>
+          <a:chExt cx="0" cy="0"/>
+        </a:xfrm>
+      </p:grpSpPr>
+      <p:sp>
+        <p:nvSpPr>
+          <p:cNvPr id="2" name="Title 1">
+            <a:extLst>
+              <a:ext uri="{FF2B5EF4-FFF2-40B4-BE49-F238E27FC236}">
+                <a16:creationId xmlns:a16="http://schemas.microsoft.com/office/drawing/2014/main" id="{DA1EABA9-ECE4-ED45-96AD-D11605468DF1}"/>
+              </a:ext>
+            </a:extLst>
+          </p:cNvPr>
+          <p:cNvSpPr>
+            <a:spLocks noGrp="1"/>
+          </p:cNvSpPr>
+          <p:nvPr>
+            <p:ph type="title"/>
+          </p:nvPr>
+        </p:nvSpPr>
+        <p:spPr>
+          <a:xfrm>
+            <a:off x="457200" y="548680"/>
+            <a:ext cx="8229600" cy="634082"/>
+          </a:xfrm>
+        </p:spPr>
+        <p:txBody>
+          <a:bodyPr/>
+          <a:lstStyle/>
+          <a:p>
+            <a:r>
+              <a:rPr lang="en-GB" sz="4000" dirty="0">
+                <a:solidFill>
+                  <a:srgbClr val="FFFFFF"/>
+                </a:solidFill>
+                <a:latin typeface="URWGothicL"/>
+              </a:rPr>
+              <a:t>Use Case Diagram</a:t>
+            </a:r>
+            <a:endParaRPr lang="en-US" sz="4000" dirty="0"/>
+          </a:p>
+        </p:txBody>
+      </p:sp>
       <p:grpSp>
         <p:nvGrpSpPr>
           <p:cNvPr id="4" name="Group 3">
@@ -4756,7 +4926,7 @@
 </p:sld>
 </file>
 
-<file path=ppt/slides/slide11.xml><?xml version="1.0" encoding="utf-8"?>
+<file path=ppt/slides/slide12.xml><?xml version="1.0" encoding="utf-8"?>
 <p:sld xmlns:a="http://schemas.openxmlformats.org/drawingml/2006/main" xmlns:r="http://schemas.openxmlformats.org/officeDocument/2006/relationships" xmlns:p="http://schemas.openxmlformats.org/presentationml/2006/main">
   <p:cSld>
     <p:spTree>
@@ -4861,147 +5031,6 @@
 </p:sld>
 </file>
 
-<file path=ppt/slides/slide12.xml><?xml version="1.0" encoding="utf-8"?>
-<p:sld xmlns:a="http://schemas.openxmlformats.org/drawingml/2006/main" xmlns:r="http://schemas.openxmlformats.org/officeDocument/2006/relationships" xmlns:p="http://schemas.openxmlformats.org/presentationml/2006/main">
-  <p:cSld>
-    <p:spTree>
-      <p:nvGrpSpPr>
-        <p:cNvPr id="1" name=""/>
-        <p:cNvGrpSpPr/>
-        <p:nvPr/>
-      </p:nvGrpSpPr>
-      <p:grpSpPr>
-        <a:xfrm>
-          <a:off x="0" y="0"/>
-          <a:ext cx="0" cy="0"/>
-          <a:chOff x="0" y="0"/>
-          <a:chExt cx="0" cy="0"/>
-        </a:xfrm>
-      </p:grpSpPr>
-      <p:sp>
-        <p:nvSpPr>
-          <p:cNvPr id="2" name="Title 1">
-            <a:extLst>
-              <a:ext uri="{FF2B5EF4-FFF2-40B4-BE49-F238E27FC236}">
-                <a16:creationId xmlns:a16="http://schemas.microsoft.com/office/drawing/2014/main" id="{DA1EABA9-ECE4-ED45-96AD-D11605468DF1}"/>
-              </a:ext>
-            </a:extLst>
-          </p:cNvPr>
-          <p:cNvSpPr>
-            <a:spLocks noGrp="1"/>
-          </p:cNvSpPr>
-          <p:nvPr>
-            <p:ph type="title"/>
-          </p:nvPr>
-        </p:nvSpPr>
-        <p:spPr>
-          <a:xfrm>
-            <a:off x="457200" y="548680"/>
-            <a:ext cx="8229600" cy="634082"/>
-          </a:xfrm>
-        </p:spPr>
-        <p:txBody>
-          <a:bodyPr/>
-          <a:lstStyle/>
-          <a:p>
-            <a:r>
-              <a:rPr lang="en-GB" sz="4000" dirty="0">
-                <a:solidFill>
-                  <a:srgbClr val="FFFFFF"/>
-                </a:solidFill>
-                <a:latin typeface="URWGothicL"/>
-              </a:rPr>
-              <a:t>Use Case Diagram – Class Exercise</a:t>
-            </a:r>
-            <a:endParaRPr lang="en-US" sz="4000" dirty="0"/>
-          </a:p>
-        </p:txBody>
-      </p:sp>
-      <p:sp>
-        <p:nvSpPr>
-          <p:cNvPr id="4" name="Content Placeholder 2">
-            <a:extLst>
-              <a:ext uri="{FF2B5EF4-FFF2-40B4-BE49-F238E27FC236}">
-                <a16:creationId xmlns:a16="http://schemas.microsoft.com/office/drawing/2014/main" id="{91E010A1-AA21-4264-82B2-F075E362A254}"/>
-              </a:ext>
-            </a:extLst>
-          </p:cNvPr>
-          <p:cNvSpPr>
-            <a:spLocks noGrp="1"/>
-          </p:cNvSpPr>
-          <p:nvPr>
-            <p:ph idx="1"/>
-          </p:nvPr>
-        </p:nvSpPr>
-        <p:spPr>
-          <a:xfrm>
-            <a:off x="457200" y="1484784"/>
-            <a:ext cx="8229600" cy="5217443"/>
-          </a:xfrm>
-        </p:spPr>
-        <p:txBody>
-          <a:bodyPr anchor="ctr">
-            <a:normAutofit/>
-          </a:bodyPr>
-          <a:lstStyle/>
-          <a:p>
-            <a:r>
-              <a:rPr lang="en-GB" sz="3200" dirty="0">
-                <a:effectLst/>
-              </a:rPr>
-              <a:t>What are the key </a:t>
-            </a:r>
-            <a:r>
-              <a:rPr lang="en-GB" sz="3200" b="1" dirty="0">
-                <a:effectLst/>
-              </a:rPr>
-              <a:t>Use Cases </a:t>
-            </a:r>
-            <a:r>
-              <a:rPr lang="en-GB" sz="3200" dirty="0">
-                <a:effectLst/>
-              </a:rPr>
-              <a:t>for </a:t>
-            </a:r>
-            <a:r>
-              <a:rPr lang="en-GB" sz="3200" b="1" dirty="0">
-                <a:effectLst/>
-              </a:rPr>
-              <a:t>Discord</a:t>
-            </a:r>
-            <a:r>
-              <a:rPr lang="en-GB" sz="3200" dirty="0">
-                <a:effectLst/>
-              </a:rPr>
-              <a:t>?</a:t>
-            </a:r>
-          </a:p>
-          <a:p>
-            <a:r>
-              <a:rPr lang="en-GB" b="1" dirty="0"/>
-              <a:t>Lets diagram it together</a:t>
-            </a:r>
-          </a:p>
-          <a:p>
-            <a:endParaRPr lang="en-GB" sz="3200" dirty="0">
-              <a:effectLst/>
-            </a:endParaRPr>
-          </a:p>
-        </p:txBody>
-      </p:sp>
-    </p:spTree>
-    <p:extLst>
-      <p:ext uri="{BB962C8B-B14F-4D97-AF65-F5344CB8AC3E}">
-        <p14:creationId xmlns:p14="http://schemas.microsoft.com/office/powerpoint/2010/main" val="1281211377"/>
-      </p:ext>
-    </p:extLst>
-  </p:cSld>
-  <p:clrMapOvr>
-    <a:masterClrMapping/>
-  </p:clrMapOvr>
-</p:sld>
-</file>
-
 <file path=ppt/slides/slide13.xml><?xml version="1.0" encoding="utf-8"?>
 <p:sld xmlns:a="http://schemas.openxmlformats.org/drawingml/2006/main" xmlns:r="http://schemas.openxmlformats.org/officeDocument/2006/relationships" xmlns:p="http://schemas.openxmlformats.org/presentationml/2006/main">
   <p:cSld>
@@ -5052,6 +5081,147 @@
                 </a:solidFill>
                 <a:latin typeface="URWGothicL"/>
               </a:rPr>
+              <a:t>Use Case Diagram – Class Exercise</a:t>
+            </a:r>
+            <a:endParaRPr lang="en-US" sz="4000" dirty="0"/>
+          </a:p>
+        </p:txBody>
+      </p:sp>
+      <p:sp>
+        <p:nvSpPr>
+          <p:cNvPr id="4" name="Content Placeholder 2">
+            <a:extLst>
+              <a:ext uri="{FF2B5EF4-FFF2-40B4-BE49-F238E27FC236}">
+                <a16:creationId xmlns:a16="http://schemas.microsoft.com/office/drawing/2014/main" id="{91E010A1-AA21-4264-82B2-F075E362A254}"/>
+              </a:ext>
+            </a:extLst>
+          </p:cNvPr>
+          <p:cNvSpPr>
+            <a:spLocks noGrp="1"/>
+          </p:cNvSpPr>
+          <p:nvPr>
+            <p:ph idx="1"/>
+          </p:nvPr>
+        </p:nvSpPr>
+        <p:spPr>
+          <a:xfrm>
+            <a:off x="457200" y="1484784"/>
+            <a:ext cx="8229600" cy="5217443"/>
+          </a:xfrm>
+        </p:spPr>
+        <p:txBody>
+          <a:bodyPr anchor="ctr">
+            <a:normAutofit/>
+          </a:bodyPr>
+          <a:lstStyle/>
+          <a:p>
+            <a:r>
+              <a:rPr lang="en-GB" sz="3200" dirty="0">
+                <a:effectLst/>
+              </a:rPr>
+              <a:t>What are the key </a:t>
+            </a:r>
+            <a:r>
+              <a:rPr lang="en-GB" sz="3200" b="1" dirty="0">
+                <a:effectLst/>
+              </a:rPr>
+              <a:t>Use Cases </a:t>
+            </a:r>
+            <a:r>
+              <a:rPr lang="en-GB" sz="3200" dirty="0">
+                <a:effectLst/>
+              </a:rPr>
+              <a:t>for </a:t>
+            </a:r>
+            <a:r>
+              <a:rPr lang="en-GB" sz="3200" b="1" dirty="0">
+                <a:effectLst/>
+              </a:rPr>
+              <a:t>Discord</a:t>
+            </a:r>
+            <a:r>
+              <a:rPr lang="en-GB" sz="3200" dirty="0">
+                <a:effectLst/>
+              </a:rPr>
+              <a:t>?</a:t>
+            </a:r>
+          </a:p>
+          <a:p>
+            <a:r>
+              <a:rPr lang="en-GB" b="1" dirty="0"/>
+              <a:t>Lets diagram it together</a:t>
+            </a:r>
+          </a:p>
+          <a:p>
+            <a:endParaRPr lang="en-GB" sz="3200" dirty="0">
+              <a:effectLst/>
+            </a:endParaRPr>
+          </a:p>
+        </p:txBody>
+      </p:sp>
+    </p:spTree>
+    <p:extLst>
+      <p:ext uri="{BB962C8B-B14F-4D97-AF65-F5344CB8AC3E}">
+        <p14:creationId xmlns:p14="http://schemas.microsoft.com/office/powerpoint/2010/main" val="1281211377"/>
+      </p:ext>
+    </p:extLst>
+  </p:cSld>
+  <p:clrMapOvr>
+    <a:masterClrMapping/>
+  </p:clrMapOvr>
+</p:sld>
+</file>
+
+<file path=ppt/slides/slide14.xml><?xml version="1.0" encoding="utf-8"?>
+<p:sld xmlns:a="http://schemas.openxmlformats.org/drawingml/2006/main" xmlns:r="http://schemas.openxmlformats.org/officeDocument/2006/relationships" xmlns:p="http://schemas.openxmlformats.org/presentationml/2006/main">
+  <p:cSld>
+    <p:spTree>
+      <p:nvGrpSpPr>
+        <p:cNvPr id="1" name=""/>
+        <p:cNvGrpSpPr/>
+        <p:nvPr/>
+      </p:nvGrpSpPr>
+      <p:grpSpPr>
+        <a:xfrm>
+          <a:off x="0" y="0"/>
+          <a:ext cx="0" cy="0"/>
+          <a:chOff x="0" y="0"/>
+          <a:chExt cx="0" cy="0"/>
+        </a:xfrm>
+      </p:grpSpPr>
+      <p:sp>
+        <p:nvSpPr>
+          <p:cNvPr id="2" name="Title 1">
+            <a:extLst>
+              <a:ext uri="{FF2B5EF4-FFF2-40B4-BE49-F238E27FC236}">
+                <a16:creationId xmlns:a16="http://schemas.microsoft.com/office/drawing/2014/main" id="{DA1EABA9-ECE4-ED45-96AD-D11605468DF1}"/>
+              </a:ext>
+            </a:extLst>
+          </p:cNvPr>
+          <p:cNvSpPr>
+            <a:spLocks noGrp="1"/>
+          </p:cNvSpPr>
+          <p:nvPr>
+            <p:ph type="title"/>
+          </p:nvPr>
+        </p:nvSpPr>
+        <p:spPr>
+          <a:xfrm>
+            <a:off x="457200" y="548680"/>
+            <a:ext cx="8229600" cy="634082"/>
+          </a:xfrm>
+        </p:spPr>
+        <p:txBody>
+          <a:bodyPr/>
+          <a:lstStyle/>
+          <a:p>
+            <a:r>
+              <a:rPr lang="en-GB" sz="4000" dirty="0">
+                <a:solidFill>
+                  <a:srgbClr val="FFFFFF"/>
+                </a:solidFill>
+                <a:latin typeface="URWGothicL"/>
+              </a:rPr>
               <a:t>Activity Diagram</a:t>
             </a:r>
             <a:endParaRPr lang="en-US" sz="4000" dirty="0"/>
@@ -5131,7 +5301,7 @@
 </p:sld>
 </file>
 
-<file path=ppt/slides/slide14.xml><?xml version="1.0" encoding="utf-8"?>
+<file path=ppt/slides/slide15.xml><?xml version="1.0" encoding="utf-8"?>
 <p:sld xmlns:a="http://schemas.openxmlformats.org/drawingml/2006/main" xmlns:r="http://schemas.openxmlformats.org/officeDocument/2006/relationships" xmlns:p="http://schemas.openxmlformats.org/presentationml/2006/main">
   <p:cSld>
     <p:spTree>
@@ -5745,7 +5915,7 @@
 </p:sld>
 </file>
 
-<file path=ppt/slides/slide15.xml><?xml version="1.0" encoding="utf-8"?>
+<file path=ppt/slides/slide16.xml><?xml version="1.0" encoding="utf-8"?>
 <p:sld xmlns:a="http://schemas.openxmlformats.org/drawingml/2006/main" xmlns:r="http://schemas.openxmlformats.org/officeDocument/2006/relationships" xmlns:p="http://schemas.openxmlformats.org/presentationml/2006/main">
   <p:cSld>
     <p:spTree>
@@ -5850,7 +6020,7 @@
 </p:sld>
 </file>
 
-<file path=ppt/slides/slide16.xml><?xml version="1.0" encoding="utf-8"?>
+<file path=ppt/slides/slide17.xml><?xml version="1.0" encoding="utf-8"?>
 <p:sld xmlns:a="http://schemas.openxmlformats.org/drawingml/2006/main" xmlns:r="http://schemas.openxmlformats.org/officeDocument/2006/relationships" xmlns:p="http://schemas.openxmlformats.org/presentationml/2006/main">
   <p:cSld>
     <p:spTree>
@@ -6005,7 +6175,7 @@
 </p:sld>
 </file>
 
-<file path=ppt/slides/slide17.xml><?xml version="1.0" encoding="utf-8"?>
+<file path=ppt/slides/slide18.xml><?xml version="1.0" encoding="utf-8"?>
 <p:sld xmlns:a="http://schemas.openxmlformats.org/drawingml/2006/main" xmlns:r="http://schemas.openxmlformats.org/officeDocument/2006/relationships" xmlns:p="http://schemas.openxmlformats.org/presentationml/2006/main">
   <p:cSld>
     <p:spTree>
@@ -7370,7 +7540,7 @@
 </p:sld>
 </file>
 
-<file path=ppt/slides/slide18.xml><?xml version="1.0" encoding="utf-8"?>
+<file path=ppt/slides/slide19.xml><?xml version="1.0" encoding="utf-8"?>
 <p:sld xmlns:a="http://schemas.openxmlformats.org/drawingml/2006/main" xmlns:r="http://schemas.openxmlformats.org/officeDocument/2006/relationships" xmlns:p="http://schemas.openxmlformats.org/presentationml/2006/main">
   <p:cSld>
     <p:spTree>
@@ -7475,7 +7645,167 @@
 </p:sld>
 </file>
 
-<file path=ppt/slides/slide19.xml><?xml version="1.0" encoding="utf-8"?>
+<file path=ppt/slides/slide2.xml><?xml version="1.0" encoding="utf-8"?>
+<p:sld xmlns:a="http://schemas.openxmlformats.org/drawingml/2006/main" xmlns:r="http://schemas.openxmlformats.org/officeDocument/2006/relationships" xmlns:p="http://schemas.openxmlformats.org/presentationml/2006/main">
+  <p:cSld>
+    <p:spTree>
+      <p:nvGrpSpPr>
+        <p:cNvPr id="1" name=""/>
+        <p:cNvGrpSpPr/>
+        <p:nvPr/>
+      </p:nvGrpSpPr>
+      <p:grpSpPr>
+        <a:xfrm>
+          <a:off x="0" y="0"/>
+          <a:ext cx="0" cy="0"/>
+          <a:chOff x="0" y="0"/>
+          <a:chExt cx="0" cy="0"/>
+        </a:xfrm>
+      </p:grpSpPr>
+      <p:sp>
+        <p:nvSpPr>
+          <p:cNvPr id="2" name="Title 1">
+            <a:extLst>
+              <a:ext uri="{FF2B5EF4-FFF2-40B4-BE49-F238E27FC236}">
+                <a16:creationId xmlns:a16="http://schemas.microsoft.com/office/drawing/2014/main" id="{DA1EABA9-ECE4-ED45-96AD-D11605468DF1}"/>
+              </a:ext>
+            </a:extLst>
+          </p:cNvPr>
+          <p:cNvSpPr>
+            <a:spLocks noGrp="1"/>
+          </p:cNvSpPr>
+          <p:nvPr>
+            <p:ph type="title"/>
+          </p:nvPr>
+        </p:nvSpPr>
+        <p:spPr>
+          <a:xfrm>
+            <a:off x="457200" y="548680"/>
+            <a:ext cx="8229600" cy="634082"/>
+          </a:xfrm>
+        </p:spPr>
+        <p:txBody>
+          <a:bodyPr/>
+          <a:lstStyle/>
+          <a:p>
+            <a:r>
+              <a:rPr lang="en-GB" sz="4000" dirty="0">
+                <a:solidFill>
+                  <a:srgbClr val="FFFFFF"/>
+                </a:solidFill>
+                <a:latin typeface="URWGothicL"/>
+              </a:rPr>
+              <a:t>Assignment Roadmap</a:t>
+            </a:r>
+            <a:endParaRPr lang="en-US" sz="4000" dirty="0"/>
+          </a:p>
+        </p:txBody>
+      </p:sp>
+      <p:sp>
+        <p:nvSpPr>
+          <p:cNvPr id="3" name="Content Placeholder 2">
+            <a:extLst>
+              <a:ext uri="{FF2B5EF4-FFF2-40B4-BE49-F238E27FC236}">
+                <a16:creationId xmlns:a16="http://schemas.microsoft.com/office/drawing/2014/main" id="{F11D3774-F227-E54D-8B35-5A75C345CFD0}"/>
+              </a:ext>
+            </a:extLst>
+          </p:cNvPr>
+          <p:cNvSpPr>
+            <a:spLocks noGrp="1"/>
+          </p:cNvSpPr>
+          <p:nvPr>
+            <p:ph idx="1"/>
+          </p:nvPr>
+        </p:nvSpPr>
+        <p:spPr>
+          <a:xfrm>
+            <a:off x="457200" y="1484784"/>
+            <a:ext cx="8229600" cy="5217443"/>
+          </a:xfrm>
+        </p:spPr>
+        <p:txBody>
+          <a:bodyPr anchor="ctr">
+            <a:normAutofit/>
+          </a:bodyPr>
+          <a:lstStyle/>
+          <a:p>
+            <a:r>
+              <a:rPr lang="en-GB" sz="2400" b="1" dirty="0"/>
+              <a:t>Assignment 1</a:t>
+            </a:r>
+          </a:p>
+          <a:p>
+            <a:pPr lvl="1"/>
+            <a:r>
+              <a:rPr lang="en-GB" sz="2000" dirty="0"/>
+              <a:t>Week 6 – First prototype of game and controller</a:t>
+            </a:r>
+          </a:p>
+          <a:p>
+            <a:pPr lvl="1"/>
+            <a:r>
+              <a:rPr lang="en-GB" sz="2000" dirty="0"/>
+              <a:t>Week 9 – Peer review of game and controller</a:t>
+            </a:r>
+          </a:p>
+          <a:p>
+            <a:r>
+              <a:rPr lang="en-GB" sz="2400" b="1" dirty="0"/>
+              <a:t>Assignment 2</a:t>
+            </a:r>
+          </a:p>
+          <a:p>
+            <a:pPr lvl="1"/>
+            <a:r>
+              <a:rPr lang="en-GB" sz="2000" dirty="0"/>
+              <a:t>Week 3 – Project Proposal</a:t>
+            </a:r>
+          </a:p>
+          <a:p>
+            <a:pPr lvl="1"/>
+            <a:r>
+              <a:rPr lang="en-GB" sz="2000" dirty="0"/>
+              <a:t>Week 8 – Draft Poster presentation</a:t>
+            </a:r>
+          </a:p>
+          <a:p>
+            <a:pPr lvl="1"/>
+            <a:r>
+              <a:rPr lang="en-GB" sz="2000" dirty="0"/>
+              <a:t>Week 10 – Report Peer Review</a:t>
+            </a:r>
+          </a:p>
+          <a:p>
+            <a:pPr marL="457200" lvl="1" indent="0">
+              <a:buNone/>
+            </a:pPr>
+            <a:endParaRPr lang="en-GB" sz="2000" dirty="0"/>
+          </a:p>
+          <a:p>
+            <a:r>
+              <a:rPr lang="en-GB" sz="2400" b="1" dirty="0"/>
+              <a:t>Next up: WEEK 6 – First Prototype of game and controller</a:t>
+            </a:r>
+          </a:p>
+          <a:p>
+            <a:endParaRPr lang="en-GB" sz="2400" dirty="0"/>
+          </a:p>
+        </p:txBody>
+      </p:sp>
+    </p:spTree>
+    <p:extLst>
+      <p:ext uri="{BB962C8B-B14F-4D97-AF65-F5344CB8AC3E}">
+        <p14:creationId xmlns:p14="http://schemas.microsoft.com/office/powerpoint/2010/main" val="3734059172"/>
+      </p:ext>
+    </p:extLst>
+  </p:cSld>
+  <p:clrMapOvr>
+    <a:masterClrMapping/>
+  </p:clrMapOvr>
+</p:sld>
+</file>
+
+<file path=ppt/slides/slide20.xml><?xml version="1.0" encoding="utf-8"?>
 <p:sld xmlns:a="http://schemas.openxmlformats.org/drawingml/2006/main" xmlns:r="http://schemas.openxmlformats.org/officeDocument/2006/relationships" xmlns:p="http://schemas.openxmlformats.org/presentationml/2006/main">
   <p:cSld>
     <p:spTree>
@@ -7606,6 +7936,76 @@
           </a:prstGeom>
         </p:spPr>
       </p:pic>
+      <p:sp>
+        <p:nvSpPr>
+          <p:cNvPr id="5" name="Rectangle 4">
+            <a:extLst>
+              <a:ext uri="{FF2B5EF4-FFF2-40B4-BE49-F238E27FC236}">
+                <a16:creationId xmlns:a16="http://schemas.microsoft.com/office/drawing/2014/main" id="{6F6906E1-8F7B-5743-A9B1-3D30B4A0D683}"/>
+              </a:ext>
+            </a:extLst>
+          </p:cNvPr>
+          <p:cNvSpPr/>
+          <p:nvPr/>
+        </p:nvSpPr>
+        <p:spPr>
+          <a:xfrm>
+            <a:off x="2060848" y="6124654"/>
+            <a:ext cx="5022304" cy="369332"/>
+          </a:xfrm>
+          <a:prstGeom prst="rect">
+            <a:avLst/>
+          </a:prstGeom>
+        </p:spPr>
+        <p:txBody>
+          <a:bodyPr wrap="square">
+            <a:spAutoFit/>
+          </a:bodyPr>
+          <a:lstStyle/>
+          <a:p>
+            <a:r>
+              <a:rPr lang="en-US" dirty="0">
+                <a:solidFill>
+                  <a:schemeClr val="bg1"/>
+                </a:solidFill>
+              </a:rPr>
+              <a:t>https://</a:t>
+            </a:r>
+            <a:r>
+              <a:rPr lang="en-US" dirty="0" err="1">
+                <a:solidFill>
+                  <a:schemeClr val="bg1"/>
+                </a:solidFill>
+              </a:rPr>
+              <a:t>www.youtube.com</a:t>
+            </a:r>
+            <a:r>
+              <a:rPr lang="en-US" dirty="0">
+                <a:solidFill>
+                  <a:schemeClr val="bg1"/>
+                </a:solidFill>
+              </a:rPr>
+              <a:t>/</a:t>
+            </a:r>
+            <a:r>
+              <a:rPr lang="en-US" dirty="0" err="1">
+                <a:solidFill>
+                  <a:schemeClr val="bg1"/>
+                </a:solidFill>
+              </a:rPr>
+              <a:t>watch?v</a:t>
+            </a:r>
+            <a:r>
+              <a:rPr lang="en-US" dirty="0">
+                <a:solidFill>
+                  <a:schemeClr val="bg1"/>
+                </a:solidFill>
+              </a:rPr>
+              <a:t>=gMk7WIGi-W0</a:t>
+            </a:r>
+          </a:p>
+        </p:txBody>
+      </p:sp>
     </p:spTree>
     <p:extLst>
       <p:ext uri="{BB962C8B-B14F-4D97-AF65-F5344CB8AC3E}">
@@ -7754,275 +8154,6 @@
 </p:sld>
 </file>
 
-<file path=ppt/slides/slide2.xml><?xml version="1.0" encoding="utf-8"?>
-<p:sld xmlns:a="http://schemas.openxmlformats.org/drawingml/2006/main" xmlns:r="http://schemas.openxmlformats.org/officeDocument/2006/relationships" xmlns:p="http://schemas.openxmlformats.org/presentationml/2006/main">
-  <p:cSld>
-    <p:spTree>
-      <p:nvGrpSpPr>
-        <p:cNvPr id="1" name=""/>
-        <p:cNvGrpSpPr/>
-        <p:nvPr/>
-      </p:nvGrpSpPr>
-      <p:grpSpPr>
-        <a:xfrm>
-          <a:off x="0" y="0"/>
-          <a:ext cx="0" cy="0"/>
-          <a:chOff x="0" y="0"/>
-          <a:chExt cx="0" cy="0"/>
-        </a:xfrm>
-      </p:grpSpPr>
-      <p:sp>
-        <p:nvSpPr>
-          <p:cNvPr id="2" name="Title 1">
-            <a:extLst>
-              <a:ext uri="{FF2B5EF4-FFF2-40B4-BE49-F238E27FC236}">
-                <a16:creationId xmlns:a16="http://schemas.microsoft.com/office/drawing/2014/main" id="{DA1EABA9-ECE4-ED45-96AD-D11605468DF1}"/>
-              </a:ext>
-            </a:extLst>
-          </p:cNvPr>
-          <p:cNvSpPr>
-            <a:spLocks noGrp="1"/>
-          </p:cNvSpPr>
-          <p:nvPr>
-            <p:ph type="title"/>
-          </p:nvPr>
-        </p:nvSpPr>
-        <p:spPr>
-          <a:xfrm>
-            <a:off x="457200" y="548680"/>
-            <a:ext cx="8229600" cy="634082"/>
-          </a:xfrm>
-        </p:spPr>
-        <p:txBody>
-          <a:bodyPr/>
-          <a:lstStyle/>
-          <a:p>
-            <a:r>
-              <a:rPr lang="en-GB" sz="4000" dirty="0">
-                <a:solidFill>
-                  <a:srgbClr val="FFFFFF"/>
-                </a:solidFill>
-                <a:latin typeface="URWGothicL"/>
-              </a:rPr>
-              <a:t>Assignment Roadmap</a:t>
-            </a:r>
-            <a:endParaRPr lang="en-US" sz="4000" dirty="0"/>
-          </a:p>
-        </p:txBody>
-      </p:sp>
-      <p:sp>
-        <p:nvSpPr>
-          <p:cNvPr id="3" name="Content Placeholder 2">
-            <a:extLst>
-              <a:ext uri="{FF2B5EF4-FFF2-40B4-BE49-F238E27FC236}">
-                <a16:creationId xmlns:a16="http://schemas.microsoft.com/office/drawing/2014/main" id="{F11D3774-F227-E54D-8B35-5A75C345CFD0}"/>
-              </a:ext>
-            </a:extLst>
-          </p:cNvPr>
-          <p:cNvSpPr>
-            <a:spLocks noGrp="1"/>
-          </p:cNvSpPr>
-          <p:nvPr>
-            <p:ph idx="1"/>
-          </p:nvPr>
-        </p:nvSpPr>
-        <p:spPr>
-          <a:xfrm>
-            <a:off x="457200" y="1484784"/>
-            <a:ext cx="8229600" cy="5217443"/>
-          </a:xfrm>
-        </p:spPr>
-        <p:txBody>
-          <a:bodyPr anchor="ctr">
-            <a:normAutofit/>
-          </a:bodyPr>
-          <a:lstStyle/>
-          <a:p>
-            <a:r>
-              <a:rPr lang="en-GB" sz="2400" b="1" dirty="0"/>
-              <a:t>Assignment 1</a:t>
-            </a:r>
-          </a:p>
-          <a:p>
-            <a:pPr lvl="1"/>
-            <a:r>
-              <a:rPr lang="en-GB" sz="2000" dirty="0"/>
-              <a:t>Week 6 – First prototype of game and controller</a:t>
-            </a:r>
-          </a:p>
-          <a:p>
-            <a:pPr lvl="1"/>
-            <a:r>
-              <a:rPr lang="en-GB" sz="2000" dirty="0"/>
-              <a:t>Week 9 – Peer review of game and controller</a:t>
-            </a:r>
-          </a:p>
-          <a:p>
-            <a:r>
-              <a:rPr lang="en-GB" sz="2400" b="1" dirty="0"/>
-              <a:t>Assignment 2</a:t>
-            </a:r>
-          </a:p>
-          <a:p>
-            <a:pPr lvl="1"/>
-            <a:r>
-              <a:rPr lang="en-GB" sz="2000" dirty="0"/>
-              <a:t>Week 3 – Project Proposal</a:t>
-            </a:r>
-          </a:p>
-          <a:p>
-            <a:pPr lvl="1"/>
-            <a:r>
-              <a:rPr lang="en-GB" sz="2000" dirty="0"/>
-              <a:t>Week 8 – Draft Poster presentation</a:t>
-            </a:r>
-          </a:p>
-          <a:p>
-            <a:pPr lvl="1"/>
-            <a:r>
-              <a:rPr lang="en-GB" sz="2000" dirty="0"/>
-              <a:t>Week 10 – Report Peer Review</a:t>
-            </a:r>
-          </a:p>
-          <a:p>
-            <a:pPr marL="457200" lvl="1" indent="0">
-              <a:buNone/>
-            </a:pPr>
-            <a:endParaRPr lang="en-GB" sz="2000" dirty="0"/>
-          </a:p>
-          <a:p>
-            <a:r>
-              <a:rPr lang="en-GB" sz="2400" b="1" dirty="0"/>
-              <a:t>Next up: WEEK 6 – First Prototype of game and controller</a:t>
-            </a:r>
-          </a:p>
-          <a:p>
-            <a:endParaRPr lang="en-GB" sz="2400" dirty="0"/>
-          </a:p>
-        </p:txBody>
-      </p:sp>
-    </p:spTree>
-    <p:extLst>
-      <p:ext uri="{BB962C8B-B14F-4D97-AF65-F5344CB8AC3E}">
-        <p14:creationId xmlns:p14="http://schemas.microsoft.com/office/powerpoint/2010/main" val="3734059172"/>
-      </p:ext>
-    </p:extLst>
-  </p:cSld>
-  <p:clrMapOvr>
-    <a:masterClrMapping/>
-  </p:clrMapOvr>
-</p:sld>
-</file>
-
-<file path=ppt/slides/slide20.xml><?xml version="1.0" encoding="utf-8"?>
-<p:sld xmlns:a="http://schemas.openxmlformats.org/drawingml/2006/main" xmlns:r="http://schemas.openxmlformats.org/officeDocument/2006/relationships" xmlns:p="http://schemas.openxmlformats.org/presentationml/2006/main">
-  <p:cSld>
-    <p:spTree>
-      <p:nvGrpSpPr>
-        <p:cNvPr id="1" name=""/>
-        <p:cNvGrpSpPr/>
-        <p:nvPr/>
-      </p:nvGrpSpPr>
-      <p:grpSpPr>
-        <a:xfrm>
-          <a:off x="0" y="0"/>
-          <a:ext cx="0" cy="0"/>
-          <a:chOff x="0" y="0"/>
-          <a:chExt cx="0" cy="0"/>
-        </a:xfrm>
-      </p:grpSpPr>
-      <p:sp>
-        <p:nvSpPr>
-          <p:cNvPr id="2" name="Title 1">
-            <a:extLst>
-              <a:ext uri="{FF2B5EF4-FFF2-40B4-BE49-F238E27FC236}">
-                <a16:creationId xmlns:a16="http://schemas.microsoft.com/office/drawing/2014/main" id="{DA1EABA9-ECE4-ED45-96AD-D11605468DF1}"/>
-              </a:ext>
-            </a:extLst>
-          </p:cNvPr>
-          <p:cNvSpPr>
-            <a:spLocks noGrp="1"/>
-          </p:cNvSpPr>
-          <p:nvPr>
-            <p:ph type="title"/>
-          </p:nvPr>
-        </p:nvSpPr>
-        <p:spPr>
-          <a:xfrm>
-            <a:off x="457200" y="548680"/>
-            <a:ext cx="8229600" cy="634082"/>
-          </a:xfrm>
-        </p:spPr>
-        <p:txBody>
-          <a:bodyPr/>
-          <a:lstStyle/>
-          <a:p>
-            <a:r>
-              <a:rPr lang="en-GB" sz="4000" dirty="0">
-                <a:solidFill>
-                  <a:srgbClr val="FFFFFF"/>
-                </a:solidFill>
-                <a:latin typeface="URWGothicL"/>
-              </a:rPr>
-              <a:t>State Diagram – Class Exercise</a:t>
-            </a:r>
-            <a:endParaRPr lang="en-US" sz="4000" dirty="0"/>
-          </a:p>
-        </p:txBody>
-      </p:sp>
-      <p:sp>
-        <p:nvSpPr>
-          <p:cNvPr id="4" name="Content Placeholder 2">
-            <a:extLst>
-              <a:ext uri="{FF2B5EF4-FFF2-40B4-BE49-F238E27FC236}">
-                <a16:creationId xmlns:a16="http://schemas.microsoft.com/office/drawing/2014/main" id="{91E010A1-AA21-4264-82B2-F075E362A254}"/>
-              </a:ext>
-            </a:extLst>
-          </p:cNvPr>
-          <p:cNvSpPr>
-            <a:spLocks noGrp="1"/>
-          </p:cNvSpPr>
-          <p:nvPr>
-            <p:ph idx="1"/>
-          </p:nvPr>
-        </p:nvSpPr>
-        <p:spPr>
-          <a:xfrm>
-            <a:off x="457200" y="1484784"/>
-            <a:ext cx="8229600" cy="5217443"/>
-          </a:xfrm>
-        </p:spPr>
-        <p:txBody>
-          <a:bodyPr anchor="ctr">
-            <a:normAutofit/>
-          </a:bodyPr>
-          <a:lstStyle/>
-          <a:p>
-            <a:r>
-              <a:rPr lang="en-GB" b="1" dirty="0"/>
-              <a:t>Identify the States of the Cathedral Grave Warden</a:t>
-            </a:r>
-          </a:p>
-          <a:p>
-            <a:endParaRPr lang="en-GB" sz="3200" dirty="0">
-              <a:effectLst/>
-            </a:endParaRPr>
-          </a:p>
-        </p:txBody>
-      </p:sp>
-    </p:spTree>
-    <p:extLst>
-      <p:ext uri="{BB962C8B-B14F-4D97-AF65-F5344CB8AC3E}">
-        <p14:creationId xmlns:p14="http://schemas.microsoft.com/office/powerpoint/2010/main" val="2841252965"/>
-      </p:ext>
-    </p:extLst>
-  </p:cSld>
-  <p:clrMapOvr>
-    <a:masterClrMapping/>
-  </p:clrMapOvr>
-</p:sld>
-</file>
-
 <file path=ppt/slides/slide21.xml><?xml version="1.0" encoding="utf-8"?>
 <p:sld xmlns:a="http://schemas.openxmlformats.org/drawingml/2006/main" xmlns:r="http://schemas.openxmlformats.org/officeDocument/2006/relationships" xmlns:p="http://schemas.openxmlformats.org/presentationml/2006/main">
   <p:cSld>
@@ -8073,6 +8204,115 @@
                 </a:solidFill>
                 <a:latin typeface="URWGothicL"/>
               </a:rPr>
+              <a:t>State Diagram – Class Exercise</a:t>
+            </a:r>
+            <a:endParaRPr lang="en-US" sz="4000" dirty="0"/>
+          </a:p>
+        </p:txBody>
+      </p:sp>
+      <p:sp>
+        <p:nvSpPr>
+          <p:cNvPr id="4" name="Content Placeholder 2">
+            <a:extLst>
+              <a:ext uri="{FF2B5EF4-FFF2-40B4-BE49-F238E27FC236}">
+                <a16:creationId xmlns:a16="http://schemas.microsoft.com/office/drawing/2014/main" id="{91E010A1-AA21-4264-82B2-F075E362A254}"/>
+              </a:ext>
+            </a:extLst>
+          </p:cNvPr>
+          <p:cNvSpPr>
+            <a:spLocks noGrp="1"/>
+          </p:cNvSpPr>
+          <p:nvPr>
+            <p:ph idx="1"/>
+          </p:nvPr>
+        </p:nvSpPr>
+        <p:spPr>
+          <a:xfrm>
+            <a:off x="457200" y="1484784"/>
+            <a:ext cx="8229600" cy="5217443"/>
+          </a:xfrm>
+        </p:spPr>
+        <p:txBody>
+          <a:bodyPr anchor="ctr">
+            <a:normAutofit/>
+          </a:bodyPr>
+          <a:lstStyle/>
+          <a:p>
+            <a:r>
+              <a:rPr lang="en-GB" b="1" dirty="0"/>
+              <a:t>Identify the States of the Cathedral Grave Warden</a:t>
+            </a:r>
+          </a:p>
+          <a:p>
+            <a:endParaRPr lang="en-GB" sz="3200" dirty="0">
+              <a:effectLst/>
+            </a:endParaRPr>
+          </a:p>
+        </p:txBody>
+      </p:sp>
+    </p:spTree>
+    <p:extLst>
+      <p:ext uri="{BB962C8B-B14F-4D97-AF65-F5344CB8AC3E}">
+        <p14:creationId xmlns:p14="http://schemas.microsoft.com/office/powerpoint/2010/main" val="2841252965"/>
+      </p:ext>
+    </p:extLst>
+  </p:cSld>
+  <p:clrMapOvr>
+    <a:masterClrMapping/>
+  </p:clrMapOvr>
+</p:sld>
+</file>
+
+<file path=ppt/slides/slide22.xml><?xml version="1.0" encoding="utf-8"?>
+<p:sld xmlns:a="http://schemas.openxmlformats.org/drawingml/2006/main" xmlns:r="http://schemas.openxmlformats.org/officeDocument/2006/relationships" xmlns:p="http://schemas.openxmlformats.org/presentationml/2006/main">
+  <p:cSld>
+    <p:spTree>
+      <p:nvGrpSpPr>
+        <p:cNvPr id="1" name=""/>
+        <p:cNvGrpSpPr/>
+        <p:nvPr/>
+      </p:nvGrpSpPr>
+      <p:grpSpPr>
+        <a:xfrm>
+          <a:off x="0" y="0"/>
+          <a:ext cx="0" cy="0"/>
+          <a:chOff x="0" y="0"/>
+          <a:chExt cx="0" cy="0"/>
+        </a:xfrm>
+      </p:grpSpPr>
+      <p:sp>
+        <p:nvSpPr>
+          <p:cNvPr id="2" name="Title 1">
+            <a:extLst>
+              <a:ext uri="{FF2B5EF4-FFF2-40B4-BE49-F238E27FC236}">
+                <a16:creationId xmlns:a16="http://schemas.microsoft.com/office/drawing/2014/main" id="{DA1EABA9-ECE4-ED45-96AD-D11605468DF1}"/>
+              </a:ext>
+            </a:extLst>
+          </p:cNvPr>
+          <p:cNvSpPr>
+            <a:spLocks noGrp="1"/>
+          </p:cNvSpPr>
+          <p:nvPr>
+            <p:ph type="title"/>
+          </p:nvPr>
+        </p:nvSpPr>
+        <p:spPr>
+          <a:xfrm>
+            <a:off x="457200" y="548680"/>
+            <a:ext cx="8229600" cy="634082"/>
+          </a:xfrm>
+        </p:spPr>
+        <p:txBody>
+          <a:bodyPr/>
+          <a:lstStyle/>
+          <a:p>
+            <a:r>
+              <a:rPr lang="en-GB" sz="4000" dirty="0">
+                <a:solidFill>
+                  <a:srgbClr val="FFFFFF"/>
+                </a:solidFill>
+                <a:latin typeface="URWGothicL"/>
+              </a:rPr>
               <a:t>Sequence Diagram</a:t>
             </a:r>
             <a:endParaRPr lang="en-US" sz="4000" dirty="0"/>
@@ -8159,7 +8399,7 @@
 </p:sld>
 </file>
 
-<file path=ppt/slides/slide22.xml><?xml version="1.0" encoding="utf-8"?>
+<file path=ppt/slides/slide23.xml><?xml version="1.0" encoding="utf-8"?>
 <p:sld xmlns:a="http://schemas.openxmlformats.org/drawingml/2006/main" xmlns:r="http://schemas.openxmlformats.org/officeDocument/2006/relationships" xmlns:p="http://schemas.openxmlformats.org/presentationml/2006/main">
   <p:cSld>
     <p:spTree>
@@ -8264,69 +8504,6 @@
 </p:sld>
 </file>
 
-<file path=ppt/slides/slide23.xml><?xml version="1.0" encoding="utf-8"?>
-<p:sld xmlns:a="http://schemas.openxmlformats.org/drawingml/2006/main" xmlns:r="http://schemas.openxmlformats.org/officeDocument/2006/relationships" xmlns:p="http://schemas.openxmlformats.org/presentationml/2006/main">
-  <p:cSld>
-    <p:spTree>
-      <p:nvGrpSpPr>
-        <p:cNvPr id="1" name=""/>
-        <p:cNvGrpSpPr/>
-        <p:nvPr/>
-      </p:nvGrpSpPr>
-      <p:grpSpPr>
-        <a:xfrm>
-          <a:off x="0" y="0"/>
-          <a:ext cx="0" cy="0"/>
-          <a:chOff x="0" y="0"/>
-          <a:chExt cx="0" cy="0"/>
-        </a:xfrm>
-      </p:grpSpPr>
-      <p:sp>
-        <p:nvSpPr>
-          <p:cNvPr id="2" name="Title 1">
-            <a:extLst>
-              <a:ext uri="{FF2B5EF4-FFF2-40B4-BE49-F238E27FC236}">
-                <a16:creationId xmlns:a16="http://schemas.microsoft.com/office/drawing/2014/main" id="{E0D39B9B-57E0-4C75-9D4A-053BECB31981}"/>
-              </a:ext>
-            </a:extLst>
-          </p:cNvPr>
-          <p:cNvSpPr>
-            <a:spLocks noGrp="1"/>
-          </p:cNvSpPr>
-          <p:nvPr>
-            <p:ph type="title"/>
-          </p:nvPr>
-        </p:nvSpPr>
-        <p:spPr>
-          <a:xfrm>
-            <a:off x="1835696" y="3088481"/>
-            <a:ext cx="5472608" cy="681038"/>
-          </a:xfrm>
-        </p:spPr>
-        <p:txBody>
-          <a:bodyPr/>
-          <a:lstStyle/>
-          <a:p>
-            <a:r>
-              <a:rPr lang="en-GB" dirty="0"/>
-              <a:t>Structural Diagrams</a:t>
-            </a:r>
-          </a:p>
-        </p:txBody>
-      </p:sp>
-    </p:spTree>
-    <p:extLst>
-      <p:ext uri="{BB962C8B-B14F-4D97-AF65-F5344CB8AC3E}">
-        <p14:creationId xmlns:p14="http://schemas.microsoft.com/office/powerpoint/2010/main" val="2974102519"/>
-      </p:ext>
-    </p:extLst>
-  </p:cSld>
-  <p:clrMapOvr>
-    <a:masterClrMapping/>
-  </p:clrMapOvr>
-</p:sld>
-</file>
-
 <file path=ppt/slides/slide24.xml><?xml version="1.0" encoding="utf-8"?>
 <p:sld xmlns:a="http://schemas.openxmlformats.org/drawingml/2006/main" xmlns:r="http://schemas.openxmlformats.org/officeDocument/2006/relationships" xmlns:p="http://schemas.openxmlformats.org/presentationml/2006/main">
   <p:cSld>
@@ -8349,6 +8526,69 @@
           <p:cNvPr id="2" name="Title 1">
             <a:extLst>
               <a:ext uri="{FF2B5EF4-FFF2-40B4-BE49-F238E27FC236}">
+                <a16:creationId xmlns:a16="http://schemas.microsoft.com/office/drawing/2014/main" id="{E0D39B9B-57E0-4C75-9D4A-053BECB31981}"/>
+              </a:ext>
+            </a:extLst>
+          </p:cNvPr>
+          <p:cNvSpPr>
+            <a:spLocks noGrp="1"/>
+          </p:cNvSpPr>
+          <p:nvPr>
+            <p:ph type="title"/>
+          </p:nvPr>
+        </p:nvSpPr>
+        <p:spPr>
+          <a:xfrm>
+            <a:off x="1835696" y="3088481"/>
+            <a:ext cx="5472608" cy="681038"/>
+          </a:xfrm>
+        </p:spPr>
+        <p:txBody>
+          <a:bodyPr/>
+          <a:lstStyle/>
+          <a:p>
+            <a:r>
+              <a:rPr lang="en-GB" dirty="0"/>
+              <a:t>Structural Diagrams</a:t>
+            </a:r>
+          </a:p>
+        </p:txBody>
+      </p:sp>
+    </p:spTree>
+    <p:extLst>
+      <p:ext uri="{BB962C8B-B14F-4D97-AF65-F5344CB8AC3E}">
+        <p14:creationId xmlns:p14="http://schemas.microsoft.com/office/powerpoint/2010/main" val="2974102519"/>
+      </p:ext>
+    </p:extLst>
+  </p:cSld>
+  <p:clrMapOvr>
+    <a:masterClrMapping/>
+  </p:clrMapOvr>
+</p:sld>
+</file>
+
+<file path=ppt/slides/slide25.xml><?xml version="1.0" encoding="utf-8"?>
+<p:sld xmlns:a="http://schemas.openxmlformats.org/drawingml/2006/main" xmlns:r="http://schemas.openxmlformats.org/officeDocument/2006/relationships" xmlns:p="http://schemas.openxmlformats.org/presentationml/2006/main">
+  <p:cSld>
+    <p:spTree>
+      <p:nvGrpSpPr>
+        <p:cNvPr id="1" name=""/>
+        <p:cNvGrpSpPr/>
+        <p:nvPr/>
+      </p:nvGrpSpPr>
+      <p:grpSpPr>
+        <a:xfrm>
+          <a:off x="0" y="0"/>
+          <a:ext cx="0" cy="0"/>
+          <a:chOff x="0" y="0"/>
+          <a:chExt cx="0" cy="0"/>
+        </a:xfrm>
+      </p:grpSpPr>
+      <p:sp>
+        <p:nvSpPr>
+          <p:cNvPr id="2" name="Title 1">
+            <a:extLst>
+              <a:ext uri="{FF2B5EF4-FFF2-40B4-BE49-F238E27FC236}">
                 <a16:creationId xmlns:a16="http://schemas.microsoft.com/office/drawing/2014/main" id="{DA1EABA9-ECE4-ED45-96AD-D11605468DF1}"/>
               </a:ext>
             </a:extLst>
@@ -8530,7 +8770,7 @@
 </p:sld>
 </file>
 
-<file path=ppt/slides/slide25.xml><?xml version="1.0" encoding="utf-8"?>
+<file path=ppt/slides/slide26.xml><?xml version="1.0" encoding="utf-8"?>
 <p:sld xmlns:a="http://schemas.openxmlformats.org/drawingml/2006/main" xmlns:r="http://schemas.openxmlformats.org/officeDocument/2006/relationships" xmlns:p="http://schemas.openxmlformats.org/presentationml/2006/main">
   <p:cSld>
     <p:spTree>
@@ -8917,7 +9157,7 @@
 </p:sld>
 </file>
 
-<file path=ppt/slides/slide26.xml><?xml version="1.0" encoding="utf-8"?>
+<file path=ppt/slides/slide27.xml><?xml version="1.0" encoding="utf-8"?>
 <p:sld xmlns:a="http://schemas.openxmlformats.org/drawingml/2006/main" xmlns:r="http://schemas.openxmlformats.org/officeDocument/2006/relationships" xmlns:p="http://schemas.openxmlformats.org/presentationml/2006/main">
   <p:cSld>
     <p:spTree>
@@ -9070,7 +9310,7 @@
 </p:sld>
 </file>
 
-<file path=ppt/slides/slide27.xml><?xml version="1.0" encoding="utf-8"?>
+<file path=ppt/slides/slide28.xml><?xml version="1.0" encoding="utf-8"?>
 <p:sld xmlns:a="http://schemas.openxmlformats.org/drawingml/2006/main" xmlns:r="http://schemas.openxmlformats.org/officeDocument/2006/relationships" xmlns:p="http://schemas.openxmlformats.org/presentationml/2006/main">
   <p:cSld>
     <p:spTree>
@@ -9290,7 +9530,7 @@
 </p:sld>
 </file>
 
-<file path=ppt/slides/slide28.xml><?xml version="1.0" encoding="utf-8"?>
+<file path=ppt/slides/slide29.xml><?xml version="1.0" encoding="utf-8"?>
 <p:sld xmlns:a="http://schemas.openxmlformats.org/drawingml/2006/main" xmlns:r="http://schemas.openxmlformats.org/officeDocument/2006/relationships" xmlns:p="http://schemas.openxmlformats.org/presentationml/2006/main">
   <p:cSld>
     <p:spTree>
@@ -9439,7 +9679,135 @@
 </p:sld>
 </file>
 
-<file path=ppt/slides/slide29.xml><?xml version="1.0" encoding="utf-8"?>
+<file path=ppt/slides/slide3.xml><?xml version="1.0" encoding="utf-8"?>
+<p:sld xmlns:a="http://schemas.openxmlformats.org/drawingml/2006/main" xmlns:r="http://schemas.openxmlformats.org/officeDocument/2006/relationships" xmlns:p="http://schemas.openxmlformats.org/presentationml/2006/main">
+  <p:cSld>
+    <p:spTree>
+      <p:nvGrpSpPr>
+        <p:cNvPr id="1" name=""/>
+        <p:cNvGrpSpPr/>
+        <p:nvPr/>
+      </p:nvGrpSpPr>
+      <p:grpSpPr>
+        <a:xfrm>
+          <a:off x="0" y="0"/>
+          <a:ext cx="0" cy="0"/>
+          <a:chOff x="0" y="0"/>
+          <a:chExt cx="0" cy="0"/>
+        </a:xfrm>
+      </p:grpSpPr>
+      <p:sp>
+        <p:nvSpPr>
+          <p:cNvPr id="2" name="Title 1">
+            <a:extLst>
+              <a:ext uri="{FF2B5EF4-FFF2-40B4-BE49-F238E27FC236}">
+                <a16:creationId xmlns:a16="http://schemas.microsoft.com/office/drawing/2014/main" id="{DA1EABA9-ECE4-ED45-96AD-D11605468DF1}"/>
+              </a:ext>
+            </a:extLst>
+          </p:cNvPr>
+          <p:cNvSpPr>
+            <a:spLocks noGrp="1"/>
+          </p:cNvSpPr>
+          <p:nvPr>
+            <p:ph type="title"/>
+          </p:nvPr>
+        </p:nvSpPr>
+        <p:spPr>
+          <a:xfrm>
+            <a:off x="457200" y="548680"/>
+            <a:ext cx="8229600" cy="634082"/>
+          </a:xfrm>
+        </p:spPr>
+        <p:txBody>
+          <a:bodyPr/>
+          <a:lstStyle/>
+          <a:p>
+            <a:r>
+              <a:rPr lang="en-GB" sz="4000" dirty="0">
+                <a:solidFill>
+                  <a:srgbClr val="FFFFFF"/>
+                </a:solidFill>
+                <a:latin typeface="URWGothicL"/>
+              </a:rPr>
+              <a:t>Learning outcomes </a:t>
+            </a:r>
+            <a:endParaRPr lang="en-US" sz="4000" dirty="0"/>
+          </a:p>
+        </p:txBody>
+      </p:sp>
+      <p:sp>
+        <p:nvSpPr>
+          <p:cNvPr id="3" name="Content Placeholder 2">
+            <a:extLst>
+              <a:ext uri="{FF2B5EF4-FFF2-40B4-BE49-F238E27FC236}">
+                <a16:creationId xmlns:a16="http://schemas.microsoft.com/office/drawing/2014/main" id="{F11D3774-F227-E54D-8B35-5A75C345CFD0}"/>
+              </a:ext>
+            </a:extLst>
+          </p:cNvPr>
+          <p:cNvSpPr>
+            <a:spLocks noGrp="1"/>
+          </p:cNvSpPr>
+          <p:nvPr>
+            <p:ph idx="1"/>
+          </p:nvPr>
+        </p:nvSpPr>
+        <p:spPr>
+          <a:xfrm>
+            <a:off x="457200" y="1484784"/>
+            <a:ext cx="8229600" cy="5217443"/>
+          </a:xfrm>
+        </p:spPr>
+        <p:txBody>
+          <a:bodyPr anchor="ctr">
+            <a:normAutofit/>
+          </a:bodyPr>
+          <a:lstStyle/>
+          <a:p>
+            <a:r>
+              <a:rPr lang="en-GB" sz="2400" b="1" dirty="0"/>
+              <a:t>Understand </a:t>
+            </a:r>
+            <a:r>
+              <a:rPr lang="en-GB" sz="2400" dirty="0"/>
+              <a:t>rationale behind UML</a:t>
+            </a:r>
+          </a:p>
+          <a:p>
+            <a:r>
+              <a:rPr lang="en-GB" sz="2400" b="1" dirty="0"/>
+              <a:t>Understand </a:t>
+            </a:r>
+            <a:r>
+              <a:rPr lang="en-GB" sz="2400" dirty="0"/>
+              <a:t>a subset of UML Diagrams useful for game development</a:t>
+            </a:r>
+          </a:p>
+          <a:p>
+            <a:r>
+              <a:rPr lang="en-GB" sz="2400" b="1" dirty="0"/>
+              <a:t>Develop </a:t>
+            </a:r>
+            <a:r>
+              <a:rPr lang="en-GB" sz="2400" dirty="0"/>
+              <a:t>some UML Diagrams</a:t>
+            </a:r>
+          </a:p>
+        </p:txBody>
+      </p:sp>
+    </p:spTree>
+    <p:extLst>
+      <p:ext uri="{BB962C8B-B14F-4D97-AF65-F5344CB8AC3E}">
+        <p14:creationId xmlns:p14="http://schemas.microsoft.com/office/powerpoint/2010/main" val="2263018052"/>
+      </p:ext>
+    </p:extLst>
+  </p:cSld>
+  <p:clrMapOvr>
+    <a:masterClrMapping/>
+  </p:clrMapOvr>
+</p:sld>
+</file>
+
+<file path=ppt/slides/slide30.xml><?xml version="1.0" encoding="utf-8"?>
 <p:sld xmlns:a="http://schemas.openxmlformats.org/drawingml/2006/main" xmlns:r="http://schemas.openxmlformats.org/officeDocument/2006/relationships" xmlns:p="http://schemas.openxmlformats.org/presentationml/2006/main">
   <p:cSld>
     <p:spTree>
@@ -9583,135 +9951,7 @@
 </p:sld>
 </file>
 
-<file path=ppt/slides/slide3.xml><?xml version="1.0" encoding="utf-8"?>
-<p:sld xmlns:a="http://schemas.openxmlformats.org/drawingml/2006/main" xmlns:r="http://schemas.openxmlformats.org/officeDocument/2006/relationships" xmlns:p="http://schemas.openxmlformats.org/presentationml/2006/main">
-  <p:cSld>
-    <p:spTree>
-      <p:nvGrpSpPr>
-        <p:cNvPr id="1" name=""/>
-        <p:cNvGrpSpPr/>
-        <p:nvPr/>
-      </p:nvGrpSpPr>
-      <p:grpSpPr>
-        <a:xfrm>
-          <a:off x="0" y="0"/>
-          <a:ext cx="0" cy="0"/>
-          <a:chOff x="0" y="0"/>
-          <a:chExt cx="0" cy="0"/>
-        </a:xfrm>
-      </p:grpSpPr>
-      <p:sp>
-        <p:nvSpPr>
-          <p:cNvPr id="2" name="Title 1">
-            <a:extLst>
-              <a:ext uri="{FF2B5EF4-FFF2-40B4-BE49-F238E27FC236}">
-                <a16:creationId xmlns:a16="http://schemas.microsoft.com/office/drawing/2014/main" id="{DA1EABA9-ECE4-ED45-96AD-D11605468DF1}"/>
-              </a:ext>
-            </a:extLst>
-          </p:cNvPr>
-          <p:cNvSpPr>
-            <a:spLocks noGrp="1"/>
-          </p:cNvSpPr>
-          <p:nvPr>
-            <p:ph type="title"/>
-          </p:nvPr>
-        </p:nvSpPr>
-        <p:spPr>
-          <a:xfrm>
-            <a:off x="457200" y="548680"/>
-            <a:ext cx="8229600" cy="634082"/>
-          </a:xfrm>
-        </p:spPr>
-        <p:txBody>
-          <a:bodyPr/>
-          <a:lstStyle/>
-          <a:p>
-            <a:r>
-              <a:rPr lang="en-GB" sz="4000" dirty="0">
-                <a:solidFill>
-                  <a:srgbClr val="FFFFFF"/>
-                </a:solidFill>
-                <a:latin typeface="URWGothicL"/>
-              </a:rPr>
-              <a:t>Learning outcomes </a:t>
-            </a:r>
-            <a:endParaRPr lang="en-US" sz="4000" dirty="0"/>
-          </a:p>
-        </p:txBody>
-      </p:sp>
-      <p:sp>
-        <p:nvSpPr>
-          <p:cNvPr id="3" name="Content Placeholder 2">
-            <a:extLst>
-              <a:ext uri="{FF2B5EF4-FFF2-40B4-BE49-F238E27FC236}">
-                <a16:creationId xmlns:a16="http://schemas.microsoft.com/office/drawing/2014/main" id="{F11D3774-F227-E54D-8B35-5A75C345CFD0}"/>
-              </a:ext>
-            </a:extLst>
-          </p:cNvPr>
-          <p:cNvSpPr>
-            <a:spLocks noGrp="1"/>
-          </p:cNvSpPr>
-          <p:nvPr>
-            <p:ph idx="1"/>
-          </p:nvPr>
-        </p:nvSpPr>
-        <p:spPr>
-          <a:xfrm>
-            <a:off x="457200" y="1484784"/>
-            <a:ext cx="8229600" cy="5217443"/>
-          </a:xfrm>
-        </p:spPr>
-        <p:txBody>
-          <a:bodyPr anchor="ctr">
-            <a:normAutofit/>
-          </a:bodyPr>
-          <a:lstStyle/>
-          <a:p>
-            <a:r>
-              <a:rPr lang="en-GB" sz="2400" b="1" dirty="0"/>
-              <a:t>Understand </a:t>
-            </a:r>
-            <a:r>
-              <a:rPr lang="en-GB" sz="2400" dirty="0"/>
-              <a:t>rationale behind UML</a:t>
-            </a:r>
-          </a:p>
-          <a:p>
-            <a:r>
-              <a:rPr lang="en-GB" sz="2400" b="1" dirty="0"/>
-              <a:t>Understand </a:t>
-            </a:r>
-            <a:r>
-              <a:rPr lang="en-GB" sz="2400" dirty="0"/>
-              <a:t>a subset of UML Diagrams useful for game development</a:t>
-            </a:r>
-          </a:p>
-          <a:p>
-            <a:r>
-              <a:rPr lang="en-GB" sz="2400" b="1" dirty="0"/>
-              <a:t>Develop </a:t>
-            </a:r>
-            <a:r>
-              <a:rPr lang="en-GB" sz="2400" dirty="0"/>
-              <a:t>some UML Diagrams</a:t>
-            </a:r>
-          </a:p>
-        </p:txBody>
-      </p:sp>
-    </p:spTree>
-    <p:extLst>
-      <p:ext uri="{BB962C8B-B14F-4D97-AF65-F5344CB8AC3E}">
-        <p14:creationId xmlns:p14="http://schemas.microsoft.com/office/powerpoint/2010/main" val="2263018052"/>
-      </p:ext>
-    </p:extLst>
-  </p:cSld>
-  <p:clrMapOvr>
-    <a:masterClrMapping/>
-  </p:clrMapOvr>
-</p:sld>
-</file>
-
-<file path=ppt/slides/slide30.xml><?xml version="1.0" encoding="utf-8"?>
+<file path=ppt/slides/slide31.xml><?xml version="1.0" encoding="utf-8"?>
 <p:sld xmlns:a="http://schemas.openxmlformats.org/drawingml/2006/main" xmlns:r="http://schemas.openxmlformats.org/officeDocument/2006/relationships" xmlns:p="http://schemas.openxmlformats.org/presentationml/2006/main">
   <p:cSld>
     <p:spTree>
@@ -9876,7 +10116,7 @@
 </p:sld>
 </file>
 
-<file path=ppt/slides/slide31.xml><?xml version="1.0" encoding="utf-8"?>
+<file path=ppt/slides/slide32.xml><?xml version="1.0" encoding="utf-8"?>
 <p:sld xmlns:a="http://schemas.openxmlformats.org/drawingml/2006/main" xmlns:r="http://schemas.openxmlformats.org/officeDocument/2006/relationships" xmlns:p="http://schemas.openxmlformats.org/presentationml/2006/main">
   <p:cSld>
     <p:spTree>
@@ -10020,7 +10260,7 @@
 </p:sld>
 </file>
 
-<file path=ppt/slides/slide32.xml><?xml version="1.0" encoding="utf-8"?>
+<file path=ppt/slides/slide33.xml><?xml version="1.0" encoding="utf-8"?>
 <p:sld xmlns:a="http://schemas.openxmlformats.org/drawingml/2006/main" xmlns:r="http://schemas.openxmlformats.org/officeDocument/2006/relationships" xmlns:p="http://schemas.openxmlformats.org/presentationml/2006/main">
   <p:cSld>
     <p:spTree>
@@ -10164,142 +10404,6 @@
 </p:sld>
 </file>
 
-<file path=ppt/slides/slide33.xml><?xml version="1.0" encoding="utf-8"?>
-<p:sld xmlns:a="http://schemas.openxmlformats.org/drawingml/2006/main" xmlns:r="http://schemas.openxmlformats.org/officeDocument/2006/relationships" xmlns:p="http://schemas.openxmlformats.org/presentationml/2006/main">
-  <p:cSld>
-    <p:spTree>
-      <p:nvGrpSpPr>
-        <p:cNvPr id="1" name=""/>
-        <p:cNvGrpSpPr/>
-        <p:nvPr/>
-      </p:nvGrpSpPr>
-      <p:grpSpPr>
-        <a:xfrm>
-          <a:off x="0" y="0"/>
-          <a:ext cx="0" cy="0"/>
-          <a:chOff x="0" y="0"/>
-          <a:chExt cx="0" cy="0"/>
-        </a:xfrm>
-      </p:grpSpPr>
-      <p:sp>
-        <p:nvSpPr>
-          <p:cNvPr id="2" name="Title 1">
-            <a:extLst>
-              <a:ext uri="{FF2B5EF4-FFF2-40B4-BE49-F238E27FC236}">
-                <a16:creationId xmlns:a16="http://schemas.microsoft.com/office/drawing/2014/main" id="{DA1EABA9-ECE4-ED45-96AD-D11605468DF1}"/>
-              </a:ext>
-            </a:extLst>
-          </p:cNvPr>
-          <p:cNvSpPr>
-            <a:spLocks noGrp="1"/>
-          </p:cNvSpPr>
-          <p:nvPr>
-            <p:ph type="title"/>
-          </p:nvPr>
-        </p:nvSpPr>
-        <p:spPr>
-          <a:xfrm>
-            <a:off x="457200" y="548680"/>
-            <a:ext cx="8229600" cy="634082"/>
-          </a:xfrm>
-        </p:spPr>
-        <p:txBody>
-          <a:bodyPr/>
-          <a:lstStyle/>
-          <a:p>
-            <a:r>
-              <a:rPr lang="en-GB" sz="4000" dirty="0">
-                <a:solidFill>
-                  <a:srgbClr val="FFFFFF"/>
-                </a:solidFill>
-                <a:latin typeface="URWGothicL"/>
-              </a:rPr>
-              <a:t>UML Tips</a:t>
-            </a:r>
-            <a:endParaRPr lang="en-US" sz="4000" dirty="0"/>
-          </a:p>
-        </p:txBody>
-      </p:sp>
-      <p:sp>
-        <p:nvSpPr>
-          <p:cNvPr id="3" name="Content Placeholder 2">
-            <a:extLst>
-              <a:ext uri="{FF2B5EF4-FFF2-40B4-BE49-F238E27FC236}">
-                <a16:creationId xmlns:a16="http://schemas.microsoft.com/office/drawing/2014/main" id="{F11D3774-F227-E54D-8B35-5A75C345CFD0}"/>
-              </a:ext>
-            </a:extLst>
-          </p:cNvPr>
-          <p:cNvSpPr>
-            <a:spLocks noGrp="1"/>
-          </p:cNvSpPr>
-          <p:nvPr>
-            <p:ph idx="1"/>
-          </p:nvPr>
-        </p:nvSpPr>
-        <p:spPr>
-          <a:xfrm>
-            <a:off x="457200" y="1484784"/>
-            <a:ext cx="8229600" cy="5217443"/>
-          </a:xfrm>
-        </p:spPr>
-        <p:txBody>
-          <a:bodyPr anchor="ctr">
-            <a:normAutofit fontScale="92500" lnSpcReduction="20000"/>
-          </a:bodyPr>
-          <a:lstStyle/>
-          <a:p>
-            <a:r>
-              <a:rPr lang="en-GB" sz="3600" dirty="0">
-                <a:effectLst/>
-              </a:rPr>
-              <a:t>While UML is a standard, like Agile it is sometimes helpful to modify for your use case</a:t>
-            </a:r>
-          </a:p>
-          <a:p>
-            <a:r>
-              <a:rPr lang="en-GB" sz="3600" dirty="0"/>
-              <a:t>You can make multiple diagrams at different levels</a:t>
-            </a:r>
-          </a:p>
-          <a:p>
-            <a:pPr lvl="1"/>
-            <a:r>
-              <a:rPr lang="en-GB" sz="3200" dirty="0">
-                <a:effectLst/>
-              </a:rPr>
-              <a:t>A high level class diagram to show relationships</a:t>
-            </a:r>
-          </a:p>
-          <a:p>
-            <a:pPr lvl="1"/>
-            <a:r>
-              <a:rPr lang="en-GB" sz="3200" dirty="0"/>
-              <a:t>Lower level which shows implementation</a:t>
-            </a:r>
-          </a:p>
-          <a:p>
-            <a:r>
-              <a:rPr lang="en-GB" sz="3600" dirty="0">
-                <a:effectLst/>
-              </a:rPr>
-              <a:t>You don’t need to use each diagram type in your projects, you will find some more useful than others</a:t>
-            </a:r>
-          </a:p>
-        </p:txBody>
-      </p:sp>
-    </p:spTree>
-    <p:extLst>
-      <p:ext uri="{BB962C8B-B14F-4D97-AF65-F5344CB8AC3E}">
-        <p14:creationId xmlns:p14="http://schemas.microsoft.com/office/powerpoint/2010/main" val="3943584856"/>
-      </p:ext>
-    </p:extLst>
-  </p:cSld>
-  <p:clrMapOvr>
-    <a:masterClrMapping/>
-  </p:clrMapOvr>
-</p:sld>
-</file>
-
 <file path=ppt/slides/slide34.xml><?xml version="1.0" encoding="utf-8"?>
 <p:sld xmlns:a="http://schemas.openxmlformats.org/drawingml/2006/main" xmlns:r="http://schemas.openxmlformats.org/officeDocument/2006/relationships" xmlns:p="http://schemas.openxmlformats.org/presentationml/2006/main">
   <p:cSld>
@@ -10350,7 +10454,7 @@
                 </a:solidFill>
                 <a:latin typeface="URWGothicL"/>
               </a:rPr>
-              <a:t>Diagramming Tools</a:t>
+              <a:t>UML Tips</a:t>
             </a:r>
             <a:endParaRPr lang="en-US" sz="4000" dirty="0"/>
           </a:p>
@@ -10380,44 +10484,45 @@
         </p:spPr>
         <p:txBody>
           <a:bodyPr anchor="ctr">
-            <a:normAutofit/>
+            <a:normAutofit fontScale="92500" lnSpcReduction="20000"/>
           </a:bodyPr>
           <a:lstStyle/>
           <a:p>
             <a:r>
-              <a:rPr lang="en-GB" dirty="0" err="1"/>
-              <a:t>Gliffy</a:t>
-            </a:r>
-            <a:r>
-              <a:rPr lang="en-GB" dirty="0"/>
-              <a:t> - </a:t>
-            </a:r>
-            <a:r>
-              <a:rPr lang="en-GB" u="sng" dirty="0">
-                <a:hlinkClick r:id="rId2"/>
+              <a:rPr lang="en-GB" sz="3600" dirty="0">
+                <a:effectLst/>
               </a:rPr>
-              <a:t>https://go.gliffy.com/go/auth/login</a:t>
-            </a:r>
-            <a:r>
-              <a:rPr lang="en-GB" u="sng" dirty="0"/>
-              <a:t> </a:t>
-            </a:r>
-            <a:endParaRPr lang="en-GB" dirty="0"/>
-          </a:p>
-          <a:p>
-            <a:r>
-              <a:rPr lang="en-GB" dirty="0"/>
-              <a:t>draw.io - </a:t>
-            </a:r>
-            <a:r>
-              <a:rPr lang="en-GB" u="sng" dirty="0">
-                <a:hlinkClick r:id="rId3"/>
+              <a:t>While UML is a standard, like Agile it is sometimes helpful to modify for your use case</a:t>
+            </a:r>
+          </a:p>
+          <a:p>
+            <a:r>
+              <a:rPr lang="en-GB" sz="3600" dirty="0"/>
+              <a:t>You can make multiple diagrams at different levels</a:t>
+            </a:r>
+          </a:p>
+          <a:p>
+            <a:pPr lvl="1"/>
+            <a:r>
+              <a:rPr lang="en-GB" sz="3200" dirty="0">
+                <a:effectLst/>
               </a:rPr>
-              <a:t>https://www.draw.io/</a:t>
-            </a:r>
-            <a:r>
-              <a:rPr lang="en-GB" dirty="0"/>
-              <a:t> </a:t>
+              <a:t>A high level class diagram to show relationships</a:t>
+            </a:r>
+          </a:p>
+          <a:p>
+            <a:pPr lvl="1"/>
+            <a:r>
+              <a:rPr lang="en-GB" sz="3200" dirty="0"/>
+              <a:t>Lower level which shows implementation</a:t>
+            </a:r>
+          </a:p>
+          <a:p>
+            <a:r>
+              <a:rPr lang="en-GB" sz="3600" dirty="0">
+                <a:effectLst/>
+              </a:rPr>
+              <a:t>You don’t need to use each diagram type in your projects, you will find some more useful than others</a:t>
             </a:r>
           </a:p>
         </p:txBody>
@@ -10425,7 +10530,7 @@
     </p:spTree>
     <p:extLst>
       <p:ext uri="{BB962C8B-B14F-4D97-AF65-F5344CB8AC3E}">
-        <p14:creationId xmlns:p14="http://schemas.microsoft.com/office/powerpoint/2010/main" val="338029304"/>
+        <p14:creationId xmlns:p14="http://schemas.microsoft.com/office/powerpoint/2010/main" val="3943584856"/>
       </p:ext>
     </p:extLst>
   </p:cSld>
@@ -11015,7 +11120,7 @@
           <p:cNvPr id="2" name="Title 1">
             <a:extLst>
               <a:ext uri="{FF2B5EF4-FFF2-40B4-BE49-F238E27FC236}">
-                <a16:creationId xmlns:a16="http://schemas.microsoft.com/office/drawing/2014/main" id="{E0D39B9B-57E0-4C75-9D4A-053BECB31981}"/>
+                <a16:creationId xmlns:a16="http://schemas.microsoft.com/office/drawing/2014/main" id="{DA1EABA9-ECE4-ED45-96AD-D11605468DF1}"/>
               </a:ext>
             </a:extLst>
           </p:cNvPr>
@@ -11028,8 +11133,8 @@
         </p:nvSpPr>
         <p:spPr>
           <a:xfrm>
-            <a:off x="1691680" y="3088481"/>
-            <a:ext cx="5760640" cy="681038"/>
+            <a:off x="457200" y="548680"/>
+            <a:ext cx="8229600" cy="634082"/>
           </a:xfrm>
         </p:spPr>
         <p:txBody>
@@ -11037,16 +11142,101 @@
           <a:lstStyle/>
           <a:p>
             <a:r>
+              <a:rPr lang="en-GB" sz="4000" dirty="0">
+                <a:solidFill>
+                  <a:srgbClr val="FFFFFF"/>
+                </a:solidFill>
+                <a:latin typeface="URWGothicL"/>
+              </a:rPr>
+              <a:t>Diagramming Tools</a:t>
+            </a:r>
+            <a:endParaRPr lang="en-US" sz="4000" dirty="0"/>
+          </a:p>
+        </p:txBody>
+      </p:sp>
+      <p:sp>
+        <p:nvSpPr>
+          <p:cNvPr id="3" name="Content Placeholder 2">
+            <a:extLst>
+              <a:ext uri="{FF2B5EF4-FFF2-40B4-BE49-F238E27FC236}">
+                <a16:creationId xmlns:a16="http://schemas.microsoft.com/office/drawing/2014/main" id="{F11D3774-F227-E54D-8B35-5A75C345CFD0}"/>
+              </a:ext>
+            </a:extLst>
+          </p:cNvPr>
+          <p:cNvSpPr>
+            <a:spLocks noGrp="1"/>
+          </p:cNvSpPr>
+          <p:nvPr>
+            <p:ph idx="1"/>
+          </p:nvPr>
+        </p:nvSpPr>
+        <p:spPr>
+          <a:xfrm>
+            <a:off x="457200" y="1484784"/>
+            <a:ext cx="8229600" cy="5217443"/>
+          </a:xfrm>
+        </p:spPr>
+        <p:txBody>
+          <a:bodyPr anchor="ctr">
+            <a:normAutofit/>
+          </a:bodyPr>
+          <a:lstStyle/>
+          <a:p>
+            <a:r>
+              <a:rPr lang="en-GB" dirty="0" err="1"/>
+              <a:t>Gliffy</a:t>
+            </a:r>
+            <a:r>
               <a:rPr lang="en-GB" dirty="0"/>
-              <a:t>Behavioural Diagrams</a:t>
-            </a:r>
+              <a:t> - </a:t>
+            </a:r>
+            <a:r>
+              <a:rPr lang="en-GB" u="sng" dirty="0">
+                <a:hlinkClick r:id="rId2"/>
+              </a:rPr>
+              <a:t>https://go.gliffy.com/go/auth/login</a:t>
+            </a:r>
+            <a:r>
+              <a:rPr lang="en-GB" u="sng" dirty="0"/>
+              <a:t> </a:t>
+            </a:r>
+            <a:endParaRPr lang="en-GB" dirty="0"/>
+          </a:p>
+          <a:p>
+            <a:r>
+              <a:rPr lang="en-GB" dirty="0"/>
+              <a:t>draw.io - </a:t>
+            </a:r>
+            <a:r>
+              <a:rPr lang="en-GB" u="sng" dirty="0">
+                <a:hlinkClick r:id="rId3"/>
+              </a:rPr>
+              <a:t>https://www.draw.io/</a:t>
+            </a:r>
+            <a:r>
+              <a:rPr lang="en-GB" dirty="0"/>
+              <a:t> </a:t>
+            </a:r>
+          </a:p>
+          <a:p>
+            <a:r>
+              <a:rPr lang="en-GB" dirty="0"/>
+              <a:t>Microsoft Visio - </a:t>
+            </a:r>
+            <a:r>
+              <a:rPr lang="en-GB" dirty="0">
+                <a:hlinkClick r:id="rId4"/>
+              </a:rPr>
+              <a:t>https://products.office.com/en-gb/visio/flowchart-software</a:t>
+            </a:r>
+            <a:endParaRPr lang="en-GB" dirty="0"/>
           </a:p>
         </p:txBody>
       </p:sp>
     </p:spTree>
     <p:extLst>
       <p:ext uri="{BB962C8B-B14F-4D97-AF65-F5344CB8AC3E}">
-        <p14:creationId xmlns:p14="http://schemas.microsoft.com/office/powerpoint/2010/main" val="775037971"/>
+        <p14:creationId xmlns:p14="http://schemas.microsoft.com/office/powerpoint/2010/main" val="377209297"/>
       </p:ext>
     </p:extLst>
   </p:cSld>
@@ -11078,7 +11268,7 @@
           <p:cNvPr id="2" name="Title 1">
             <a:extLst>
               <a:ext uri="{FF2B5EF4-FFF2-40B4-BE49-F238E27FC236}">
-                <a16:creationId xmlns:a16="http://schemas.microsoft.com/office/drawing/2014/main" id="{DA1EABA9-ECE4-ED45-96AD-D11605468DF1}"/>
+                <a16:creationId xmlns:a16="http://schemas.microsoft.com/office/drawing/2014/main" id="{E0D39B9B-57E0-4C75-9D4A-053BECB31981}"/>
               </a:ext>
             </a:extLst>
           </p:cNvPr>
@@ -11091,8 +11281,8 @@
         </p:nvSpPr>
         <p:spPr>
           <a:xfrm>
-            <a:off x="457200" y="548680"/>
-            <a:ext cx="8229600" cy="634082"/>
+            <a:off x="1691680" y="3088481"/>
+            <a:ext cx="5760640" cy="681038"/>
           </a:xfrm>
         </p:spPr>
         <p:txBody>
@@ -11100,123 +11290,16 @@
           <a:lstStyle/>
           <a:p>
             <a:r>
-              <a:rPr lang="en-GB" sz="4000" dirty="0">
-                <a:solidFill>
-                  <a:srgbClr val="FFFFFF"/>
-                </a:solidFill>
-                <a:latin typeface="URWGothicL"/>
-              </a:rPr>
-              <a:t>Use Case Diagram</a:t>
-            </a:r>
-            <a:endParaRPr lang="en-US" sz="4000" dirty="0"/>
-          </a:p>
-        </p:txBody>
-      </p:sp>
-      <p:sp>
-        <p:nvSpPr>
-          <p:cNvPr id="3" name="Content Placeholder 2">
-            <a:extLst>
-              <a:ext uri="{FF2B5EF4-FFF2-40B4-BE49-F238E27FC236}">
-                <a16:creationId xmlns:a16="http://schemas.microsoft.com/office/drawing/2014/main" id="{F11D3774-F227-E54D-8B35-5A75C345CFD0}"/>
-              </a:ext>
-            </a:extLst>
-          </p:cNvPr>
-          <p:cNvSpPr>
-            <a:spLocks noGrp="1"/>
-          </p:cNvSpPr>
-          <p:nvPr>
-            <p:ph idx="1"/>
-          </p:nvPr>
-        </p:nvSpPr>
-        <p:spPr>
-          <a:xfrm>
-            <a:off x="457200" y="1484784"/>
-            <a:ext cx="8229600" cy="5217443"/>
-          </a:xfrm>
-        </p:spPr>
-        <p:txBody>
-          <a:bodyPr anchor="ctr">
-            <a:normAutofit fontScale="92500" lnSpcReduction="10000"/>
-          </a:bodyPr>
-          <a:lstStyle/>
-          <a:p>
-            <a:r>
-              <a:rPr lang="en-GB" sz="3200" dirty="0">
-                <a:effectLst/>
-              </a:rPr>
-              <a:t>Use Case diagrams typically details the user’s interaction with the system</a:t>
-            </a:r>
-          </a:p>
-          <a:p>
-            <a:r>
               <a:rPr lang="en-GB" dirty="0"/>
-              <a:t>In essence it details the </a:t>
-            </a:r>
-            <a:r>
-              <a:rPr lang="en-GB" b="1" dirty="0"/>
-              <a:t>Use Case</a:t>
-            </a:r>
-            <a:r>
-              <a:rPr lang="en-GB" dirty="0"/>
-              <a:t> of the system and the </a:t>
-            </a:r>
-            <a:r>
-              <a:rPr lang="en-GB" b="1" dirty="0"/>
-              <a:t>Actors</a:t>
-            </a:r>
-            <a:r>
-              <a:rPr lang="en-GB" dirty="0"/>
-              <a:t> which interact with the system</a:t>
-            </a:r>
-          </a:p>
-          <a:p>
-            <a:pPr lvl="1"/>
-            <a:r>
-              <a:rPr lang="en-GB" b="1" dirty="0"/>
-              <a:t>NB.</a:t>
-            </a:r>
-            <a:r>
-              <a:rPr lang="en-GB" dirty="0"/>
-              <a:t> These </a:t>
-            </a:r>
-            <a:r>
-              <a:rPr lang="en-GB" b="1" dirty="0"/>
-              <a:t>Actors</a:t>
-            </a:r>
-            <a:r>
-              <a:rPr lang="en-GB" dirty="0"/>
-              <a:t> could be other systems!</a:t>
-            </a:r>
-          </a:p>
-          <a:p>
-            <a:r>
-              <a:rPr lang="en-GB" dirty="0"/>
-              <a:t>Created using terms that a layman could understand</a:t>
-            </a:r>
-          </a:p>
-          <a:p>
-            <a:r>
-              <a:rPr lang="en-GB" dirty="0"/>
-              <a:t>Can be used to capture and communicate User Requirements</a:t>
-            </a:r>
-          </a:p>
-          <a:p>
-            <a:r>
-              <a:rPr lang="en-GB" dirty="0"/>
-              <a:t>This is often the first diagram created for a system</a:t>
-            </a:r>
-          </a:p>
-          <a:p>
-            <a:endParaRPr lang="en-GB" sz="3200" dirty="0">
-              <a:effectLst/>
-            </a:endParaRPr>
+              <a:t>Behavioural Diagrams</a:t>
+            </a:r>
           </a:p>
         </p:txBody>
       </p:sp>
     </p:spTree>
     <p:extLst>
       <p:ext uri="{BB962C8B-B14F-4D97-AF65-F5344CB8AC3E}">
-        <p14:creationId xmlns:p14="http://schemas.microsoft.com/office/powerpoint/2010/main" val="1124580537"/>
+        <p14:creationId xmlns:p14="http://schemas.microsoft.com/office/powerpoint/2010/main" val="775037971"/>
       </p:ext>
     </p:extLst>
   </p:cSld>

</xml_diff>